<commit_message>
Some More Changes 5
</commit_message>
<xml_diff>
--- a/Presentation1.pptx
+++ b/Presentation1.pptx
@@ -700,7 +700,7 @@
           </a:lstStyle>
           <a:p>
             <a:r>
-              <a:rPr lang="en-US" smtClean="0"/>
+              <a:rPr lang="en-US"/>
               <a:t>Click to edit Master title style</a:t>
             </a:r>
             <a:endParaRPr lang="en-US" dirty="0"/>
@@ -820,7 +820,7 @@
           </a:lstStyle>
           <a:p>
             <a:r>
-              <a:rPr lang="en-US" smtClean="0"/>
+              <a:rPr lang="en-US"/>
               <a:t>Click to edit Master subtitle style</a:t>
             </a:r>
             <a:endParaRPr lang="en-US" dirty="0"/>
@@ -844,7 +844,7 @@
           <a:p>
             <a:fld id="{47DCCB16-3D75-4ED4-BC33-1F318222F354}" type="datetimeFigureOut">
               <a:rPr lang="en-US" smtClean="0"/>
-              <a:t>2/4/2021</a:t>
+              <a:t>3/27/2021</a:t>
             </a:fld>
             <a:endParaRPr lang="en-US"/>
           </a:p>
@@ -949,7 +949,7 @@
           </a:lstStyle>
           <a:p>
             <a:r>
-              <a:rPr lang="en-US" smtClean="0"/>
+              <a:rPr lang="en-US"/>
               <a:t>Click to edit Master title style</a:t>
             </a:r>
             <a:endParaRPr lang="en-US" dirty="0"/>
@@ -1072,7 +1072,7 @@
           <a:p>
             <a:pPr lvl="0"/>
             <a:r>
-              <a:rPr lang="en-US" smtClean="0"/>
+              <a:rPr lang="en-US"/>
               <a:t>Click to edit Master text styles</a:t>
             </a:r>
           </a:p>
@@ -1095,7 +1095,7 @@
           <a:p>
             <a:fld id="{47DCCB16-3D75-4ED4-BC33-1F318222F354}" type="datetimeFigureOut">
               <a:rPr lang="en-US" smtClean="0"/>
-              <a:t>2/4/2021</a:t>
+              <a:t>3/27/2021</a:t>
             </a:fld>
             <a:endParaRPr lang="en-US"/>
           </a:p>
@@ -1200,7 +1200,7 @@
           </a:lstStyle>
           <a:p>
             <a:r>
-              <a:rPr lang="en-US" smtClean="0"/>
+              <a:rPr lang="en-US"/>
               <a:t>Click to edit Master title style</a:t>
             </a:r>
             <a:endParaRPr lang="en-US" dirty="0"/>
@@ -1264,7 +1264,7 @@
           <a:p>
             <a:pPr lvl="0"/>
             <a:r>
-              <a:rPr lang="en-US" smtClean="0"/>
+              <a:rPr lang="en-US"/>
               <a:t>Click to edit Master text styles</a:t>
             </a:r>
           </a:p>
@@ -1386,7 +1386,7 @@
           <a:p>
             <a:pPr lvl="0"/>
             <a:r>
-              <a:rPr lang="en-US" smtClean="0"/>
+              <a:rPr lang="en-US"/>
               <a:t>Click to edit Master text styles</a:t>
             </a:r>
           </a:p>
@@ -1409,7 +1409,7 @@
           <a:p>
             <a:fld id="{47DCCB16-3D75-4ED4-BC33-1F318222F354}" type="datetimeFigureOut">
               <a:rPr lang="en-US" smtClean="0"/>
-              <a:t>2/4/2021</a:t>
+              <a:t>3/27/2021</a:t>
             </a:fld>
             <a:endParaRPr lang="en-US"/>
           </a:p>
@@ -1604,7 +1604,7 @@
           </a:lstStyle>
           <a:p>
             <a:r>
-              <a:rPr lang="en-US" smtClean="0"/>
+              <a:rPr lang="en-US"/>
               <a:t>Click to edit Master title style</a:t>
             </a:r>
             <a:endParaRPr lang="en-US" dirty="0"/>
@@ -1727,7 +1727,7 @@
           <a:p>
             <a:pPr lvl="0"/>
             <a:r>
-              <a:rPr lang="en-US" smtClean="0"/>
+              <a:rPr lang="en-US"/>
               <a:t>Click to edit Master text styles</a:t>
             </a:r>
           </a:p>
@@ -1750,7 +1750,7 @@
           <a:p>
             <a:fld id="{47DCCB16-3D75-4ED4-BC33-1F318222F354}" type="datetimeFigureOut">
               <a:rPr lang="en-US" smtClean="0"/>
-              <a:t>2/4/2021</a:t>
+              <a:t>3/27/2021</a:t>
             </a:fld>
             <a:endParaRPr lang="en-US"/>
           </a:p>
@@ -1855,7 +1855,7 @@
           </a:lstStyle>
           <a:p>
             <a:r>
-              <a:rPr lang="en-US" smtClean="0"/>
+              <a:rPr lang="en-US"/>
               <a:t>Click to edit Master title style</a:t>
             </a:r>
             <a:endParaRPr lang="en-US" dirty="0"/>
@@ -1919,7 +1919,7 @@
           <a:p>
             <a:pPr lvl="0"/>
             <a:r>
-              <a:rPr lang="en-US" smtClean="0"/>
+              <a:rPr lang="en-US"/>
               <a:t>Click to edit Master text styles</a:t>
             </a:r>
           </a:p>
@@ -2041,7 +2041,7 @@
           <a:p>
             <a:pPr lvl="0"/>
             <a:r>
-              <a:rPr lang="en-US" smtClean="0"/>
+              <a:rPr lang="en-US"/>
               <a:t>Click to edit Master text styles</a:t>
             </a:r>
           </a:p>
@@ -2064,7 +2064,7 @@
           <a:p>
             <a:fld id="{47DCCB16-3D75-4ED4-BC33-1F318222F354}" type="datetimeFigureOut">
               <a:rPr lang="en-US" smtClean="0"/>
-              <a:t>2/4/2021</a:t>
+              <a:t>3/27/2021</a:t>
             </a:fld>
             <a:endParaRPr lang="en-US"/>
           </a:p>
@@ -2251,7 +2251,7 @@
           </a:lstStyle>
           <a:p>
             <a:r>
-              <a:rPr lang="en-US" smtClean="0"/>
+              <a:rPr lang="en-US"/>
               <a:t>Click to edit Master title style</a:t>
             </a:r>
             <a:endParaRPr lang="en-US" dirty="0"/>
@@ -2312,7 +2312,7 @@
           <a:p>
             <a:pPr lvl="0"/>
             <a:r>
-              <a:rPr lang="en-US" smtClean="0"/>
+              <a:rPr lang="en-US"/>
               <a:t>Click to edit Master text styles</a:t>
             </a:r>
           </a:p>
@@ -2434,7 +2434,7 @@
           <a:p>
             <a:pPr lvl="0"/>
             <a:r>
-              <a:rPr lang="en-US" smtClean="0"/>
+              <a:rPr lang="en-US"/>
               <a:t>Click to edit Master text styles</a:t>
             </a:r>
           </a:p>
@@ -2457,7 +2457,7 @@
           <a:p>
             <a:fld id="{47DCCB16-3D75-4ED4-BC33-1F318222F354}" type="datetimeFigureOut">
               <a:rPr lang="en-US" smtClean="0"/>
-              <a:t>2/4/2021</a:t>
+              <a:t>3/27/2021</a:t>
             </a:fld>
             <a:endParaRPr lang="en-US"/>
           </a:p>
@@ -2551,7 +2551,7 @@
           <a:lstStyle/>
           <a:p>
             <a:r>
-              <a:rPr lang="en-US" smtClean="0"/>
+              <a:rPr lang="en-US"/>
               <a:t>Click to edit Master title style</a:t>
             </a:r>
             <a:endParaRPr lang="en-US" dirty="0"/>
@@ -2575,35 +2575,35 @@
           <a:p>
             <a:pPr lvl="0"/>
             <a:r>
-              <a:rPr lang="en-US" smtClean="0"/>
+              <a:rPr lang="en-US"/>
               <a:t>Click to edit Master text styles</a:t>
             </a:r>
           </a:p>
           <a:p>
             <a:pPr lvl="1"/>
             <a:r>
-              <a:rPr lang="en-US" smtClean="0"/>
+              <a:rPr lang="en-US"/>
               <a:t>Second level</a:t>
             </a:r>
           </a:p>
           <a:p>
             <a:pPr lvl="2"/>
             <a:r>
-              <a:rPr lang="en-US" smtClean="0"/>
+              <a:rPr lang="en-US"/>
               <a:t>Third level</a:t>
             </a:r>
           </a:p>
           <a:p>
             <a:pPr lvl="3"/>
             <a:r>
-              <a:rPr lang="en-US" smtClean="0"/>
+              <a:rPr lang="en-US"/>
               <a:t>Fourth level</a:t>
             </a:r>
           </a:p>
           <a:p>
             <a:pPr lvl="4"/>
             <a:r>
-              <a:rPr lang="en-US" smtClean="0"/>
+              <a:rPr lang="en-US"/>
               <a:t>Fifth level</a:t>
             </a:r>
             <a:endParaRPr lang="en-US" dirty="0"/>
@@ -2627,7 +2627,7 @@
           <a:p>
             <a:fld id="{47DCCB16-3D75-4ED4-BC33-1F318222F354}" type="datetimeFigureOut">
               <a:rPr lang="en-US" smtClean="0"/>
-              <a:t>2/4/2021</a:t>
+              <a:t>3/27/2021</a:t>
             </a:fld>
             <a:endParaRPr lang="en-US"/>
           </a:p>
@@ -2726,7 +2726,7 @@
           <a:lstStyle/>
           <a:p>
             <a:r>
-              <a:rPr lang="en-US" smtClean="0"/>
+              <a:rPr lang="en-US"/>
               <a:t>Click to edit Master title style</a:t>
             </a:r>
             <a:endParaRPr lang="en-US" dirty="0"/>
@@ -2755,35 +2755,35 @@
           <a:p>
             <a:pPr lvl="0"/>
             <a:r>
-              <a:rPr lang="en-US" smtClean="0"/>
+              <a:rPr lang="en-US"/>
               <a:t>Click to edit Master text styles</a:t>
             </a:r>
           </a:p>
           <a:p>
             <a:pPr lvl="1"/>
             <a:r>
-              <a:rPr lang="en-US" smtClean="0"/>
+              <a:rPr lang="en-US"/>
               <a:t>Second level</a:t>
             </a:r>
           </a:p>
           <a:p>
             <a:pPr lvl="2"/>
             <a:r>
-              <a:rPr lang="en-US" smtClean="0"/>
+              <a:rPr lang="en-US"/>
               <a:t>Third level</a:t>
             </a:r>
           </a:p>
           <a:p>
             <a:pPr lvl="3"/>
             <a:r>
-              <a:rPr lang="en-US" smtClean="0"/>
+              <a:rPr lang="en-US"/>
               <a:t>Fourth level</a:t>
             </a:r>
           </a:p>
           <a:p>
             <a:pPr lvl="4"/>
             <a:r>
-              <a:rPr lang="en-US" smtClean="0"/>
+              <a:rPr lang="en-US"/>
               <a:t>Fifth level</a:t>
             </a:r>
             <a:endParaRPr lang="en-US" dirty="0"/>
@@ -2807,7 +2807,7 @@
           <a:p>
             <a:fld id="{47DCCB16-3D75-4ED4-BC33-1F318222F354}" type="datetimeFigureOut">
               <a:rPr lang="en-US" smtClean="0"/>
-              <a:t>2/4/2021</a:t>
+              <a:t>3/27/2021</a:t>
             </a:fld>
             <a:endParaRPr lang="en-US"/>
           </a:p>
@@ -2907,7 +2907,7 @@
           </a:lstStyle>
           <a:p>
             <a:r>
-              <a:rPr lang="en-US" smtClean="0"/>
+              <a:rPr lang="en-US"/>
               <a:t>Click to edit Master title style</a:t>
             </a:r>
             <a:endParaRPr lang="en-US" dirty="0"/>
@@ -2931,35 +2931,35 @@
           <a:p>
             <a:pPr lvl="0"/>
             <a:r>
-              <a:rPr lang="en-US" smtClean="0"/>
+              <a:rPr lang="en-US"/>
               <a:t>Click to edit Master text styles</a:t>
             </a:r>
           </a:p>
           <a:p>
             <a:pPr lvl="1"/>
             <a:r>
-              <a:rPr lang="en-US" smtClean="0"/>
+              <a:rPr lang="en-US"/>
               <a:t>Second level</a:t>
             </a:r>
           </a:p>
           <a:p>
             <a:pPr lvl="2"/>
             <a:r>
-              <a:rPr lang="en-US" smtClean="0"/>
+              <a:rPr lang="en-US"/>
               <a:t>Third level</a:t>
             </a:r>
           </a:p>
           <a:p>
             <a:pPr lvl="3"/>
             <a:r>
-              <a:rPr lang="en-US" smtClean="0"/>
+              <a:rPr lang="en-US"/>
               <a:t>Fourth level</a:t>
             </a:r>
           </a:p>
           <a:p>
             <a:pPr lvl="4"/>
             <a:r>
-              <a:rPr lang="en-US" smtClean="0"/>
+              <a:rPr lang="en-US"/>
               <a:t>Fifth level</a:t>
             </a:r>
             <a:endParaRPr lang="en-US" dirty="0"/>
@@ -2983,7 +2983,7 @@
           <a:p>
             <a:fld id="{47DCCB16-3D75-4ED4-BC33-1F318222F354}" type="datetimeFigureOut">
               <a:rPr lang="en-US" smtClean="0"/>
-              <a:t>2/4/2021</a:t>
+              <a:t>3/27/2021</a:t>
             </a:fld>
             <a:endParaRPr lang="en-US"/>
           </a:p>
@@ -3086,7 +3086,7 @@
           </a:lstStyle>
           <a:p>
             <a:r>
-              <a:rPr lang="en-US" smtClean="0"/>
+              <a:rPr lang="en-US"/>
               <a:t>Click to edit Master title style</a:t>
             </a:r>
             <a:endParaRPr lang="en-US" dirty="0"/>
@@ -3207,7 +3207,7 @@
           <a:p>
             <a:pPr lvl="0"/>
             <a:r>
-              <a:rPr lang="en-US" smtClean="0"/>
+              <a:rPr lang="en-US"/>
               <a:t>Click to edit Master text styles</a:t>
             </a:r>
           </a:p>
@@ -3230,7 +3230,7 @@
           <a:p>
             <a:fld id="{47DCCB16-3D75-4ED4-BC33-1F318222F354}" type="datetimeFigureOut">
               <a:rPr lang="en-US" smtClean="0"/>
-              <a:t>2/4/2021</a:t>
+              <a:t>3/27/2021</a:t>
             </a:fld>
             <a:endParaRPr lang="en-US"/>
           </a:p>
@@ -3324,7 +3324,7 @@
           <a:lstStyle/>
           <a:p>
             <a:r>
-              <a:rPr lang="en-US" smtClean="0"/>
+              <a:rPr lang="en-US"/>
               <a:t>Click to edit Master title style</a:t>
             </a:r>
             <a:endParaRPr lang="en-US" dirty="0"/>
@@ -3353,35 +3353,35 @@
           <a:p>
             <a:pPr lvl="0"/>
             <a:r>
-              <a:rPr lang="en-US" smtClean="0"/>
+              <a:rPr lang="en-US"/>
               <a:t>Click to edit Master text styles</a:t>
             </a:r>
           </a:p>
           <a:p>
             <a:pPr lvl="1"/>
             <a:r>
-              <a:rPr lang="en-US" smtClean="0"/>
+              <a:rPr lang="en-US"/>
               <a:t>Second level</a:t>
             </a:r>
           </a:p>
           <a:p>
             <a:pPr lvl="2"/>
             <a:r>
-              <a:rPr lang="en-US" smtClean="0"/>
+              <a:rPr lang="en-US"/>
               <a:t>Third level</a:t>
             </a:r>
           </a:p>
           <a:p>
             <a:pPr lvl="3"/>
             <a:r>
-              <a:rPr lang="en-US" smtClean="0"/>
+              <a:rPr lang="en-US"/>
               <a:t>Fourth level</a:t>
             </a:r>
           </a:p>
           <a:p>
             <a:pPr lvl="4"/>
             <a:r>
-              <a:rPr lang="en-US" smtClean="0"/>
+              <a:rPr lang="en-US"/>
               <a:t>Fifth level</a:t>
             </a:r>
             <a:endParaRPr lang="en-US" dirty="0"/>
@@ -3410,35 +3410,35 @@
           <a:p>
             <a:pPr lvl="0"/>
             <a:r>
-              <a:rPr lang="en-US" smtClean="0"/>
+              <a:rPr lang="en-US"/>
               <a:t>Click to edit Master text styles</a:t>
             </a:r>
           </a:p>
           <a:p>
             <a:pPr lvl="1"/>
             <a:r>
-              <a:rPr lang="en-US" smtClean="0"/>
+              <a:rPr lang="en-US"/>
               <a:t>Second level</a:t>
             </a:r>
           </a:p>
           <a:p>
             <a:pPr lvl="2"/>
             <a:r>
-              <a:rPr lang="en-US" smtClean="0"/>
+              <a:rPr lang="en-US"/>
               <a:t>Third level</a:t>
             </a:r>
           </a:p>
           <a:p>
             <a:pPr lvl="3"/>
             <a:r>
-              <a:rPr lang="en-US" smtClean="0"/>
+              <a:rPr lang="en-US"/>
               <a:t>Fourth level</a:t>
             </a:r>
           </a:p>
           <a:p>
             <a:pPr lvl="4"/>
             <a:r>
-              <a:rPr lang="en-US" smtClean="0"/>
+              <a:rPr lang="en-US"/>
               <a:t>Fifth level</a:t>
             </a:r>
             <a:endParaRPr lang="en-US" dirty="0"/>
@@ -3462,7 +3462,7 @@
           <a:p>
             <a:fld id="{47DCCB16-3D75-4ED4-BC33-1F318222F354}" type="datetimeFigureOut">
               <a:rPr lang="en-US" smtClean="0"/>
-              <a:t>2/4/2021</a:t>
+              <a:t>3/27/2021</a:t>
             </a:fld>
             <a:endParaRPr lang="en-US"/>
           </a:p>
@@ -3560,7 +3560,7 @@
           </a:lstStyle>
           <a:p>
             <a:r>
-              <a:rPr lang="en-US" smtClean="0"/>
+              <a:rPr lang="en-US"/>
               <a:t>Click to edit Master title style</a:t>
             </a:r>
             <a:endParaRPr lang="en-US" dirty="0"/>
@@ -3628,7 +3628,7 @@
           <a:p>
             <a:pPr lvl="0"/>
             <a:r>
-              <a:rPr lang="en-US" smtClean="0"/>
+              <a:rPr lang="en-US"/>
               <a:t>Click to edit Master text styles</a:t>
             </a:r>
           </a:p>
@@ -3658,35 +3658,35 @@
           <a:p>
             <a:pPr lvl="0"/>
             <a:r>
-              <a:rPr lang="en-US" smtClean="0"/>
+              <a:rPr lang="en-US"/>
               <a:t>Click to edit Master text styles</a:t>
             </a:r>
           </a:p>
           <a:p>
             <a:pPr lvl="1"/>
             <a:r>
-              <a:rPr lang="en-US" smtClean="0"/>
+              <a:rPr lang="en-US"/>
               <a:t>Second level</a:t>
             </a:r>
           </a:p>
           <a:p>
             <a:pPr lvl="2"/>
             <a:r>
-              <a:rPr lang="en-US" smtClean="0"/>
+              <a:rPr lang="en-US"/>
               <a:t>Third level</a:t>
             </a:r>
           </a:p>
           <a:p>
             <a:pPr lvl="3"/>
             <a:r>
-              <a:rPr lang="en-US" smtClean="0"/>
+              <a:rPr lang="en-US"/>
               <a:t>Fourth level</a:t>
             </a:r>
           </a:p>
           <a:p>
             <a:pPr lvl="4"/>
             <a:r>
-              <a:rPr lang="en-US" smtClean="0"/>
+              <a:rPr lang="en-US"/>
               <a:t>Fifth level</a:t>
             </a:r>
             <a:endParaRPr lang="en-US" dirty="0"/>
@@ -3754,7 +3754,7 @@
           <a:p>
             <a:pPr lvl="0"/>
             <a:r>
-              <a:rPr lang="en-US" smtClean="0"/>
+              <a:rPr lang="en-US"/>
               <a:t>Click to edit Master text styles</a:t>
             </a:r>
           </a:p>
@@ -3784,35 +3784,35 @@
           <a:p>
             <a:pPr lvl="0"/>
             <a:r>
-              <a:rPr lang="en-US" smtClean="0"/>
+              <a:rPr lang="en-US"/>
               <a:t>Click to edit Master text styles</a:t>
             </a:r>
           </a:p>
           <a:p>
             <a:pPr lvl="1"/>
             <a:r>
-              <a:rPr lang="en-US" smtClean="0"/>
+              <a:rPr lang="en-US"/>
               <a:t>Second level</a:t>
             </a:r>
           </a:p>
           <a:p>
             <a:pPr lvl="2"/>
             <a:r>
-              <a:rPr lang="en-US" smtClean="0"/>
+              <a:rPr lang="en-US"/>
               <a:t>Third level</a:t>
             </a:r>
           </a:p>
           <a:p>
             <a:pPr lvl="3"/>
             <a:r>
-              <a:rPr lang="en-US" smtClean="0"/>
+              <a:rPr lang="en-US"/>
               <a:t>Fourth level</a:t>
             </a:r>
           </a:p>
           <a:p>
             <a:pPr lvl="4"/>
             <a:r>
-              <a:rPr lang="en-US" smtClean="0"/>
+              <a:rPr lang="en-US"/>
               <a:t>Fifth level</a:t>
             </a:r>
             <a:endParaRPr lang="en-US" dirty="0"/>
@@ -3836,7 +3836,7 @@
           <a:p>
             <a:fld id="{47DCCB16-3D75-4ED4-BC33-1F318222F354}" type="datetimeFigureOut">
               <a:rPr lang="en-US" smtClean="0"/>
-              <a:t>2/4/2021</a:t>
+              <a:t>3/27/2021</a:t>
             </a:fld>
             <a:endParaRPr lang="en-US"/>
           </a:p>
@@ -3935,7 +3935,7 @@
           <a:lstStyle/>
           <a:p>
             <a:r>
-              <a:rPr lang="en-US" smtClean="0"/>
+              <a:rPr lang="en-US"/>
               <a:t>Click to edit Master title style</a:t>
             </a:r>
             <a:endParaRPr lang="en-US" dirty="0"/>
@@ -3959,7 +3959,7 @@
           <a:p>
             <a:fld id="{47DCCB16-3D75-4ED4-BC33-1F318222F354}" type="datetimeFigureOut">
               <a:rPr lang="en-US" smtClean="0"/>
-              <a:t>2/4/2021</a:t>
+              <a:t>3/27/2021</a:t>
             </a:fld>
             <a:endParaRPr lang="en-US"/>
           </a:p>
@@ -4054,7 +4054,7 @@
           <a:p>
             <a:fld id="{47DCCB16-3D75-4ED4-BC33-1F318222F354}" type="datetimeFigureOut">
               <a:rPr lang="en-US" smtClean="0"/>
-              <a:t>2/4/2021</a:t>
+              <a:t>3/27/2021</a:t>
             </a:fld>
             <a:endParaRPr lang="en-US"/>
           </a:p>
@@ -4159,7 +4159,7 @@
           </a:lstStyle>
           <a:p>
             <a:r>
-              <a:rPr lang="en-US" smtClean="0"/>
+              <a:rPr lang="en-US"/>
               <a:t>Click to edit Master title style</a:t>
             </a:r>
             <a:endParaRPr lang="en-US" dirty="0"/>
@@ -4190,35 +4190,35 @@
           <a:p>
             <a:pPr lvl="0"/>
             <a:r>
-              <a:rPr lang="en-US" smtClean="0"/>
+              <a:rPr lang="en-US"/>
               <a:t>Click to edit Master text styles</a:t>
             </a:r>
           </a:p>
           <a:p>
             <a:pPr lvl="1"/>
             <a:r>
-              <a:rPr lang="en-US" smtClean="0"/>
+              <a:rPr lang="en-US"/>
               <a:t>Second level</a:t>
             </a:r>
           </a:p>
           <a:p>
             <a:pPr lvl="2"/>
             <a:r>
-              <a:rPr lang="en-US" smtClean="0"/>
+              <a:rPr lang="en-US"/>
               <a:t>Third level</a:t>
             </a:r>
           </a:p>
           <a:p>
             <a:pPr lvl="3"/>
             <a:r>
-              <a:rPr lang="en-US" smtClean="0"/>
+              <a:rPr lang="en-US"/>
               <a:t>Fourth level</a:t>
             </a:r>
           </a:p>
           <a:p>
             <a:pPr lvl="4"/>
             <a:r>
-              <a:rPr lang="en-US" smtClean="0"/>
+              <a:rPr lang="en-US"/>
               <a:t>Fifth level</a:t>
             </a:r>
             <a:endParaRPr lang="en-US" dirty="0"/>
@@ -4286,7 +4286,7 @@
           <a:p>
             <a:pPr lvl="0"/>
             <a:r>
-              <a:rPr lang="en-US" smtClean="0"/>
+              <a:rPr lang="en-US"/>
               <a:t>Click to edit Master text styles</a:t>
             </a:r>
           </a:p>
@@ -4309,7 +4309,7 @@
           <a:p>
             <a:fld id="{47DCCB16-3D75-4ED4-BC33-1F318222F354}" type="datetimeFigureOut">
               <a:rPr lang="en-US" smtClean="0"/>
-              <a:t>2/4/2021</a:t>
+              <a:t>3/27/2021</a:t>
             </a:fld>
             <a:endParaRPr lang="en-US"/>
           </a:p>
@@ -4414,7 +4414,7 @@
           </a:lstStyle>
           <a:p>
             <a:r>
-              <a:rPr lang="en-US" smtClean="0"/>
+              <a:rPr lang="en-US"/>
               <a:t>Click to edit Master title style</a:t>
             </a:r>
             <a:endParaRPr lang="en-US" dirty="0"/>
@@ -4481,7 +4481,7 @@
           </a:lstStyle>
           <a:p>
             <a:r>
-              <a:rPr lang="en-US" smtClean="0"/>
+              <a:rPr lang="en-US"/>
               <a:t>Click icon to add picture</a:t>
             </a:r>
             <a:endParaRPr lang="en-US" dirty="0"/>
@@ -4549,7 +4549,7 @@
           <a:p>
             <a:pPr lvl="0"/>
             <a:r>
-              <a:rPr lang="en-US" smtClean="0"/>
+              <a:rPr lang="en-US"/>
               <a:t>Click to edit Master text styles</a:t>
             </a:r>
           </a:p>
@@ -4572,7 +4572,7 @@
           <a:p>
             <a:fld id="{47DCCB16-3D75-4ED4-BC33-1F318222F354}" type="datetimeFigureOut">
               <a:rPr lang="en-US" smtClean="0"/>
-              <a:t>2/4/2021</a:t>
+              <a:t>3/27/2021</a:t>
             </a:fld>
             <a:endParaRPr lang="en-US"/>
           </a:p>
@@ -5211,7 +5211,7 @@
           <a:lstStyle/>
           <a:p>
             <a:r>
-              <a:rPr lang="en-US" smtClean="0"/>
+              <a:rPr lang="en-US"/>
               <a:t>Click to edit Master title style</a:t>
             </a:r>
             <a:endParaRPr lang="en-US" dirty="0"/>
@@ -5245,35 +5245,35 @@
           <a:p>
             <a:pPr lvl="0"/>
             <a:r>
-              <a:rPr lang="en-US" smtClean="0"/>
+              <a:rPr lang="en-US"/>
               <a:t>Click to edit Master text styles</a:t>
             </a:r>
           </a:p>
           <a:p>
             <a:pPr lvl="1"/>
             <a:r>
-              <a:rPr lang="en-US" smtClean="0"/>
+              <a:rPr lang="en-US"/>
               <a:t>Second level</a:t>
             </a:r>
           </a:p>
           <a:p>
             <a:pPr lvl="2"/>
             <a:r>
-              <a:rPr lang="en-US" smtClean="0"/>
+              <a:rPr lang="en-US"/>
               <a:t>Third level</a:t>
             </a:r>
           </a:p>
           <a:p>
             <a:pPr lvl="3"/>
             <a:r>
-              <a:rPr lang="en-US" smtClean="0"/>
+              <a:rPr lang="en-US"/>
               <a:t>Fourth level</a:t>
             </a:r>
           </a:p>
           <a:p>
             <a:pPr lvl="4"/>
             <a:r>
-              <a:rPr lang="en-US" smtClean="0"/>
+              <a:rPr lang="en-US"/>
               <a:t>Fifth level</a:t>
             </a:r>
             <a:endParaRPr lang="en-US" dirty="0"/>
@@ -5315,7 +5315,7 @@
           <a:p>
             <a:fld id="{47DCCB16-3D75-4ED4-BC33-1F318222F354}" type="datetimeFigureOut">
               <a:rPr lang="en-US" smtClean="0"/>
-              <a:t>2/4/2021</a:t>
+              <a:t>3/27/2021</a:t>
             </a:fld>
             <a:endParaRPr lang="en-US"/>
           </a:p>
@@ -5855,10 +5855,9 @@
           <a:lstStyle/>
           <a:p>
             <a:r>
-              <a:rPr lang="en-US" dirty="0" smtClean="0"/>
+              <a:rPr lang="en-US" dirty="0"/>
               <a:t>Let’s Code</a:t>
             </a:r>
-            <a:endParaRPr lang="en-US" dirty="0"/>
           </a:p>
         </p:txBody>
       </p:sp>
@@ -5884,7 +5883,7 @@
           <a:p>
             <a:pPr algn="just"/>
             <a:r>
-              <a:rPr lang="en-US" dirty="0" smtClean="0"/>
+              <a:rPr lang="en-US" dirty="0"/>
               <a:t>An app which reminds a person to code everyday and build the habit of coding.</a:t>
             </a:r>
           </a:p>
@@ -5913,7 +5912,7 @@
           <a:lstStyle/>
           <a:p>
             <a:r>
-              <a:rPr lang="en-US" dirty="0" smtClean="0">
+              <a:rPr lang="en-US" dirty="0">
                 <a:solidFill>
                   <a:schemeClr val="accent1"/>
                 </a:solidFill>
@@ -5926,7 +5925,7 @@
               <a:buAutoNum type="arabicPeriod"/>
             </a:pPr>
             <a:r>
-              <a:rPr lang="en-US" dirty="0" err="1" smtClean="0">
+              <a:rPr lang="en-US" dirty="0" err="1">
                 <a:solidFill>
                   <a:schemeClr val="accent1"/>
                 </a:solidFill>
@@ -5934,7 +5933,7 @@
               <a:t>Kapil</a:t>
             </a:r>
             <a:r>
-              <a:rPr lang="en-US" dirty="0" smtClean="0">
+              <a:rPr lang="en-US" dirty="0">
                 <a:solidFill>
                   <a:schemeClr val="accent1"/>
                 </a:solidFill>
@@ -5942,7 +5941,7 @@
               <a:t> </a:t>
             </a:r>
             <a:r>
-              <a:rPr lang="en-US" dirty="0" err="1" smtClean="0">
+              <a:rPr lang="en-US" dirty="0" err="1">
                 <a:solidFill>
                   <a:schemeClr val="accent1"/>
                 </a:solidFill>
@@ -5950,7 +5949,7 @@
               <a:t>Motwani</a:t>
             </a:r>
             <a:r>
-              <a:rPr lang="en-US" dirty="0" smtClean="0">
+              <a:rPr lang="en-US" dirty="0">
                 <a:solidFill>
                   <a:schemeClr val="accent1"/>
                 </a:solidFill>
@@ -5963,7 +5962,7 @@
               <a:buAutoNum type="arabicPeriod"/>
             </a:pPr>
             <a:r>
-              <a:rPr lang="en-US" dirty="0" err="1" smtClean="0">
+              <a:rPr lang="en-US" dirty="0" err="1">
                 <a:solidFill>
                   <a:schemeClr val="accent1"/>
                 </a:solidFill>
@@ -5971,78 +5970,25 @@
               <a:t>Keval</a:t>
             </a:r>
             <a:r>
-              <a:rPr lang="en-US" dirty="0" smtClean="0">
+              <a:rPr lang="en-US" dirty="0">
                 <a:solidFill>
                   <a:schemeClr val="accent1"/>
                 </a:solidFill>
               </a:rPr>
-              <a:t> Lad </a:t>
-            </a:r>
-            <a:r>
-              <a:rPr lang="en-US" dirty="0">
-                <a:solidFill>
-                  <a:schemeClr val="accent1"/>
-                </a:solidFill>
-              </a:rPr>
-              <a:t>( </a:t>
-            </a:r>
-            <a:r>
-              <a:rPr lang="en-US" dirty="0" smtClean="0">
-                <a:solidFill>
-                  <a:schemeClr val="accent1"/>
-                </a:solidFill>
-              </a:rPr>
-              <a:t>19DCS055 </a:t>
-            </a:r>
-            <a:r>
-              <a:rPr lang="en-US" dirty="0">
-                <a:solidFill>
-                  <a:schemeClr val="accent1"/>
-                </a:solidFill>
-              </a:rPr>
-              <a:t>)</a:t>
-            </a:r>
-            <a:endParaRPr lang="en-US" dirty="0" smtClean="0">
-              <a:solidFill>
-                <a:schemeClr val="accent1"/>
-              </a:solidFill>
-            </a:endParaRPr>
+              <a:t> Lad ( 19DCS055 )</a:t>
+            </a:r>
           </a:p>
           <a:p>
             <a:pPr marL="342900" indent="-342900">
               <a:buAutoNum type="arabicPeriod"/>
             </a:pPr>
             <a:r>
-              <a:rPr lang="en-US" dirty="0" smtClean="0">
+              <a:rPr lang="en-US" dirty="0">
                 <a:solidFill>
                   <a:schemeClr val="accent1"/>
                 </a:solidFill>
               </a:rPr>
-              <a:t>Ajay Pal </a:t>
-            </a:r>
-            <a:r>
-              <a:rPr lang="en-US" dirty="0">
-                <a:solidFill>
-                  <a:schemeClr val="accent1"/>
-                </a:solidFill>
-              </a:rPr>
-              <a:t>( </a:t>
-            </a:r>
-            <a:r>
-              <a:rPr lang="en-US" dirty="0" smtClean="0">
-                <a:solidFill>
-                  <a:schemeClr val="accent1"/>
-                </a:solidFill>
-              </a:rPr>
-              <a:t>19DCS070 </a:t>
-            </a:r>
-            <a:r>
-              <a:rPr lang="en-US" dirty="0">
-                <a:solidFill>
-                  <a:schemeClr val="accent1"/>
-                </a:solidFill>
-              </a:rPr>
-              <a:t>)</a:t>
+              <a:t>Ajay Pal ( 19DCS070 )</a:t>
             </a:r>
           </a:p>
         </p:txBody>
@@ -6060,13 +6006,6 @@
   <p:transition spd="slow">
     <p:wipe/>
   </p:transition>
-  <p:timing>
-    <p:tnLst>
-      <p:par>
-        <p:cTn id="1" dur="indefinite" restart="never" nodeType="tmRoot"/>
-      </p:par>
-    </p:tnLst>
-  </p:timing>
 </p:sld>
 </file>
 
@@ -6103,10 +6042,9 @@
           <a:lstStyle/>
           <a:p>
             <a:r>
-              <a:rPr lang="en-US" dirty="0" smtClean="0"/>
+              <a:rPr lang="en-US" dirty="0"/>
               <a:t>References</a:t>
             </a:r>
-            <a:endParaRPr lang="en-US" dirty="0"/>
           </a:p>
         </p:txBody>
       </p:sp>
@@ -6126,48 +6064,48 @@
           <a:lstStyle/>
           <a:p>
             <a:r>
-              <a:rPr lang="en-US" dirty="0" smtClean="0">
+              <a:rPr lang="en-US" dirty="0">
                 <a:hlinkClick r:id="rId2"/>
               </a:rPr>
               <a:t>Html Documentation</a:t>
             </a:r>
-            <a:endParaRPr lang="en-US" dirty="0" smtClean="0"/>
-          </a:p>
-          <a:p>
-            <a:r>
-              <a:rPr lang="en-US" dirty="0" smtClean="0">
+            <a:endParaRPr lang="en-US" dirty="0"/>
+          </a:p>
+          <a:p>
+            <a:r>
+              <a:rPr lang="en-US" dirty="0">
                 <a:hlinkClick r:id="rId3"/>
               </a:rPr>
               <a:t>Css Documentation</a:t>
             </a:r>
-            <a:endParaRPr lang="en-US" dirty="0" smtClean="0"/>
-          </a:p>
-          <a:p>
-            <a:r>
-              <a:rPr lang="en-US" dirty="0" smtClean="0">
+            <a:endParaRPr lang="en-US" dirty="0"/>
+          </a:p>
+          <a:p>
+            <a:r>
+              <a:rPr lang="en-US" dirty="0">
                 <a:hlinkClick r:id="rId4"/>
               </a:rPr>
               <a:t>JavaScript Documentation</a:t>
             </a:r>
-            <a:endParaRPr lang="en-US" dirty="0" smtClean="0"/>
-          </a:p>
-          <a:p>
-            <a:r>
-              <a:rPr lang="en-US" dirty="0" smtClean="0">
+            <a:endParaRPr lang="en-US" dirty="0"/>
+          </a:p>
+          <a:p>
+            <a:r>
+              <a:rPr lang="en-US" dirty="0">
                 <a:hlinkClick r:id="rId5"/>
               </a:rPr>
               <a:t>Mongo Database Documentation</a:t>
             </a:r>
-            <a:endParaRPr lang="en-US" dirty="0" smtClean="0"/>
-          </a:p>
-          <a:p>
-            <a:r>
-              <a:rPr lang="en-US" dirty="0" smtClean="0">
+            <a:endParaRPr lang="en-US" dirty="0"/>
+          </a:p>
+          <a:p>
+            <a:r>
+              <a:rPr lang="en-US" dirty="0">
                 <a:hlinkClick r:id="rId6"/>
               </a:rPr>
               <a:t>Web Development Playlist on YouTube</a:t>
             </a:r>
-            <a:endParaRPr lang="en-US" dirty="0" smtClean="0"/>
+            <a:endParaRPr lang="en-US" dirty="0"/>
           </a:p>
         </p:txBody>
       </p:sp>
@@ -6193,13 +6131,6 @@
       </p:transition>
     </mc:Fallback>
   </mc:AlternateContent>
-  <p:timing>
-    <p:tnLst>
-      <p:par>
-        <p:cTn id="1" dur="indefinite" restart="never" nodeType="tmRoot"/>
-      </p:par>
-    </p:tnLst>
-  </p:timing>
 </p:sld>
 </file>
 
@@ -6244,7 +6175,7 @@
           <a:p>
             <a:pPr algn="ctr"/>
             <a:r>
-              <a:rPr lang="en-US" sz="13800" b="1" u="sng" cap="none" spc="0" dirty="0" smtClean="0">
+              <a:rPr lang="en-US" sz="13800" b="1" u="sng" cap="none" spc="0" dirty="0">
                 <a:ln w="22225">
                   <a:solidFill>
                     <a:schemeClr val="accent2"/>
@@ -6261,21 +6192,6 @@
               </a:rPr>
               <a:t>Thank You</a:t>
             </a:r>
-            <a:endParaRPr lang="en-US" sz="13800" b="1" u="sng" cap="none" spc="0" dirty="0">
-              <a:ln w="22225">
-                <a:solidFill>
-                  <a:schemeClr val="accent2"/>
-                </a:solidFill>
-                <a:prstDash val="solid"/>
-              </a:ln>
-              <a:solidFill>
-                <a:schemeClr val="accent2">
-                  <a:lumMod val="40000"/>
-                  <a:lumOff val="60000"/>
-                </a:schemeClr>
-              </a:solidFill>
-              <a:effectLst/>
-            </a:endParaRPr>
           </a:p>
         </p:txBody>
       </p:sp>
@@ -6301,13 +6217,6 @@
       </p:transition>
     </mc:Fallback>
   </mc:AlternateContent>
-  <p:timing>
-    <p:tnLst>
-      <p:par>
-        <p:cTn id="1" dur="indefinite" restart="never" nodeType="tmRoot"/>
-      </p:par>
-    </p:tnLst>
-  </p:timing>
 </p:sld>
 </file>
 
@@ -6346,10 +6255,9 @@
           <a:lstStyle/>
           <a:p>
             <a:r>
-              <a:rPr lang="en-US" sz="4400" dirty="0" smtClean="0"/>
+              <a:rPr lang="en-US" sz="4400" dirty="0"/>
               <a:t>Table Of Contents</a:t>
             </a:r>
-            <a:endParaRPr lang="en-US" sz="4400" dirty="0"/>
           </a:p>
         </p:txBody>
       </p:sp>
@@ -6369,45 +6277,45 @@
           <a:lstStyle/>
           <a:p>
             <a:r>
-              <a:rPr lang="en-US" dirty="0" smtClean="0"/>
+              <a:rPr lang="en-US" dirty="0"/>
               <a:t>What is coding?</a:t>
             </a:r>
           </a:p>
           <a:p>
             <a:r>
-              <a:rPr lang="en-US" dirty="0" smtClean="0"/>
+              <a:rPr lang="en-US" dirty="0"/>
               <a:t>Why coding habit is important for anyone?</a:t>
             </a:r>
           </a:p>
           <a:p>
             <a:r>
-              <a:rPr lang="en-US" dirty="0" smtClean="0"/>
+              <a:rPr lang="en-US" dirty="0"/>
               <a:t>How our web application helps the user to develop the habit of coding?</a:t>
             </a:r>
           </a:p>
           <a:p>
             <a:r>
-              <a:rPr lang="en-US" dirty="0" smtClean="0"/>
+              <a:rPr lang="en-US" dirty="0"/>
               <a:t>Features which will be offered by our web application.</a:t>
             </a:r>
           </a:p>
           <a:p>
             <a:r>
-              <a:rPr lang="en-US" dirty="0" smtClean="0"/>
+              <a:rPr lang="en-US" dirty="0"/>
               <a:t>Technologies which we will use.</a:t>
             </a:r>
           </a:p>
           <a:p>
             <a:r>
-              <a:rPr lang="en-US" dirty="0" smtClean="0"/>
+              <a:rPr lang="en-US" dirty="0"/>
               <a:t>References</a:t>
             </a:r>
           </a:p>
           <a:p>
-            <a:endParaRPr lang="en-US" dirty="0" smtClean="0"/>
-          </a:p>
-          <a:p>
-            <a:endParaRPr lang="en-US" dirty="0" smtClean="0"/>
+            <a:endParaRPr lang="en-US" dirty="0"/>
+          </a:p>
+          <a:p>
+            <a:endParaRPr lang="en-US" dirty="0"/>
           </a:p>
           <a:p>
             <a:pPr marL="0" indent="0">
@@ -6430,13 +6338,6 @@
   <p:transition spd="med">
     <p:pull/>
   </p:transition>
-  <p:timing>
-    <p:tnLst>
-      <p:par>
-        <p:cTn id="1" dur="indefinite" restart="never" nodeType="tmRoot"/>
-      </p:par>
-    </p:tnLst>
-  </p:timing>
 </p:sld>
 </file>
 
@@ -6475,10 +6376,9 @@
           <a:lstStyle/>
           <a:p>
             <a:r>
-              <a:rPr lang="en-US" sz="4400" dirty="0" smtClean="0"/>
+              <a:rPr lang="en-US" sz="4400" dirty="0"/>
               <a:t>What is Coding?</a:t>
             </a:r>
-            <a:endParaRPr lang="en-US" sz="4400" dirty="0"/>
           </a:p>
         </p:txBody>
       </p:sp>
@@ -6499,33 +6399,20 @@
           <a:p>
             <a:r>
               <a:rPr lang="en-US" dirty="0"/>
-              <a:t>Coding is what makes it possible for us to create computer software, apps and websites</a:t>
-            </a:r>
-            <a:r>
-              <a:rPr lang="en-US" dirty="0" smtClean="0"/>
-              <a:t>.</a:t>
-            </a:r>
-          </a:p>
-          <a:p>
-            <a:r>
-              <a:rPr lang="en-US" dirty="0" smtClean="0"/>
-              <a:t> </a:t>
-            </a:r>
+              <a:t>Coding is what makes it possible for us to create computer software, apps and websites.</a:t>
+            </a:r>
+          </a:p>
+          <a:p>
             <a:r>
               <a:rPr lang="en-US" dirty="0"/>
-              <a:t>Your browser, your OS, the apps on your phone, Facebook, and this website – they’re all made with code</a:t>
-            </a:r>
-            <a:r>
-              <a:rPr lang="en-US" dirty="0" smtClean="0"/>
-              <a:t>.</a:t>
-            </a:r>
-          </a:p>
-          <a:p>
-            <a:r>
-              <a:rPr lang="en-US" dirty="0" smtClean="0"/>
+              <a:t> Your browser, your OS, the apps on your phone, Facebook, and this website – they’re all made with code.</a:t>
+            </a:r>
+          </a:p>
+          <a:p>
+            <a:r>
+              <a:rPr lang="en-US" dirty="0"/>
               <a:t>Coding is done using various coding languages.</a:t>
             </a:r>
-            <a:endParaRPr lang="en-US" dirty="0"/>
           </a:p>
         </p:txBody>
       </p:sp>
@@ -6582,13 +6469,6 @@
   <p:transition spd="slow">
     <p:push dir="u"/>
   </p:transition>
-  <p:timing>
-    <p:tnLst>
-      <p:par>
-        <p:cTn id="1" dur="indefinite" restart="never" nodeType="tmRoot"/>
-      </p:par>
-    </p:tnLst>
-  </p:timing>
 </p:sld>
 </file>
 
@@ -6627,10 +6507,9 @@
           <a:lstStyle/>
           <a:p>
             <a:r>
-              <a:rPr lang="en-US" sz="4400" dirty="0" smtClean="0"/>
+              <a:rPr lang="en-US" sz="4400" dirty="0"/>
               <a:t>Why Coding habit is important?</a:t>
             </a:r>
-            <a:endParaRPr lang="en-US" sz="4400" dirty="0"/>
           </a:p>
         </p:txBody>
       </p:sp>
@@ -6650,18 +6529,14 @@
           <a:lstStyle/>
           <a:p>
             <a:r>
-              <a:rPr lang="en-US" dirty="0" smtClean="0"/>
+              <a:rPr lang="en-US" dirty="0"/>
               <a:t>Coding habit is important because coding skills comes with regular practice of various kinds of coding problems.</a:t>
             </a:r>
           </a:p>
           <a:p>
             <a:r>
-              <a:rPr lang="en-US" dirty="0" smtClean="0"/>
-              <a:t>Both </a:t>
-            </a:r>
-            <a:r>
               <a:rPr lang="en-US" dirty="0"/>
-              <a:t>good and bad. But when you start adopting the right </a:t>
+              <a:t>Both good and bad. But when you start adopting the right </a:t>
             </a:r>
             <a:r>
               <a:rPr lang="en-US" b="1" dirty="0"/>
@@ -6671,16 +6546,11 @@
               <a:rPr lang="en-US" dirty="0"/>
               <a:t> you can seriously boost your efficiency. </a:t>
             </a:r>
-            <a:endParaRPr lang="en-US" dirty="0" smtClean="0"/>
-          </a:p>
-          <a:p>
-            <a:r>
-              <a:rPr lang="en-US" dirty="0" smtClean="0"/>
-              <a:t>Not </a:t>
-            </a:r>
+          </a:p>
+          <a:p>
             <a:r>
               <a:rPr lang="en-US" dirty="0"/>
-              <a:t>only will these good </a:t>
+              <a:t>Not only will these good </a:t>
             </a:r>
             <a:r>
               <a:rPr lang="en-US" b="1" dirty="0"/>
@@ -6715,13 +6585,6 @@
       </p:transition>
     </mc:Fallback>
   </mc:AlternateContent>
-  <p:timing>
-    <p:tnLst>
-      <p:par>
-        <p:cTn id="1" dur="indefinite" restart="never" nodeType="tmRoot"/>
-      </p:par>
-    </p:tnLst>
-  </p:timing>
 </p:sld>
 </file>
 
@@ -6765,10 +6628,9 @@
           <a:lstStyle/>
           <a:p>
             <a:r>
-              <a:rPr lang="en-US" sz="4400" dirty="0" smtClean="0"/>
+              <a:rPr lang="en-US" sz="4400" dirty="0"/>
               <a:t>Features of our Web Application</a:t>
             </a:r>
-            <a:endParaRPr lang="en-US" sz="4400" dirty="0"/>
           </a:p>
         </p:txBody>
       </p:sp>
@@ -6793,33 +6655,33 @@
           <a:lstStyle/>
           <a:p>
             <a:r>
-              <a:rPr lang="en-US" dirty="0" smtClean="0"/>
+              <a:rPr lang="en-US" dirty="0"/>
               <a:t>It will remind you everyday through email notification to code.</a:t>
             </a:r>
           </a:p>
           <a:p>
             <a:r>
-              <a:rPr lang="en-US" dirty="0" smtClean="0"/>
+              <a:rPr lang="en-US" dirty="0"/>
               <a:t>If you are a beginner then it will show you a pathway to become a pro coder from a </a:t>
             </a:r>
             <a:r>
-              <a:rPr lang="en-US" dirty="0" err="1" smtClean="0"/>
+              <a:rPr lang="en-US" dirty="0" err="1"/>
               <a:t>noob</a:t>
             </a:r>
             <a:r>
-              <a:rPr lang="en-US" dirty="0" smtClean="0"/>
+              <a:rPr lang="en-US" dirty="0"/>
               <a:t> coder.</a:t>
             </a:r>
           </a:p>
           <a:p>
             <a:r>
-              <a:rPr lang="en-US" dirty="0" smtClean="0"/>
+              <a:rPr lang="en-US" dirty="0"/>
               <a:t>Also it will be a really personalized web application which will suggest you problems according to your current level.</a:t>
             </a:r>
           </a:p>
           <a:p>
             <a:r>
-              <a:rPr lang="en-US" dirty="0" smtClean="0"/>
+              <a:rPr lang="en-US" dirty="0"/>
               <a:t>Also it will notify users about latest contests on different websites which is suitable for the users.</a:t>
             </a:r>
           </a:p>
@@ -6947,13 +6809,6 @@
       </p:transition>
     </mc:Fallback>
   </mc:AlternateContent>
-  <p:timing>
-    <p:tnLst>
-      <p:par>
-        <p:cTn id="1" dur="indefinite" restart="never" nodeType="tmRoot"/>
-      </p:par>
-    </p:tnLst>
-  </p:timing>
 </p:sld>
 </file>
 
@@ -6992,10 +6847,9 @@
           <a:lstStyle/>
           <a:p>
             <a:r>
-              <a:rPr lang="en-US" sz="4400" dirty="0" smtClean="0"/>
+              <a:rPr lang="en-US" sz="4400" dirty="0"/>
               <a:t>Technologies which we will use.</a:t>
             </a:r>
-            <a:endParaRPr lang="en-US" sz="4400" dirty="0"/>
           </a:p>
         </p:txBody>
       </p:sp>
@@ -7015,22 +6869,21 @@
           <a:lstStyle/>
           <a:p>
             <a:r>
-              <a:rPr lang="en-US" dirty="0" smtClean="0"/>
+              <a:rPr lang="en-US" dirty="0"/>
               <a:t>HTML , CSS , JavaScript  for Frontend Development.</a:t>
             </a:r>
           </a:p>
           <a:p>
             <a:r>
-              <a:rPr lang="en-US" dirty="0" smtClean="0"/>
+              <a:rPr lang="en-US" dirty="0"/>
               <a:t>JavaScript for Backend Development.</a:t>
             </a:r>
           </a:p>
           <a:p>
             <a:r>
-              <a:rPr lang="en-US" dirty="0" smtClean="0"/>
+              <a:rPr lang="en-US" dirty="0"/>
               <a:t>Mongo DB for Database.</a:t>
             </a:r>
-            <a:endParaRPr lang="en-US" dirty="0"/>
           </a:p>
         </p:txBody>
       </p:sp>
@@ -7047,13 +6900,6 @@
   <p:transition spd="slow">
     <p:comb dir="vert"/>
   </p:transition>
-  <p:timing>
-    <p:tnLst>
-      <p:par>
-        <p:cTn id="1" dur="indefinite" restart="never" nodeType="tmRoot"/>
-      </p:par>
-    </p:tnLst>
-  </p:timing>
 </p:sld>
 </file>
 
@@ -7092,10 +6938,9 @@
           <a:lstStyle/>
           <a:p>
             <a:r>
-              <a:rPr lang="en-US" sz="4400" dirty="0" smtClean="0"/>
+              <a:rPr lang="en-US" sz="4400" dirty="0"/>
               <a:t>HTML , CSS, and JavaScript</a:t>
             </a:r>
-            <a:endParaRPr lang="en-US" sz="4400" dirty="0"/>
           </a:p>
         </p:txBody>
       </p:sp>
@@ -7174,13 +7019,8 @@
             </a:r>
             <a:r>
               <a:rPr lang="en-US" dirty="0"/>
-              <a:t> of different elements</a:t>
-            </a:r>
-            <a:r>
-              <a:rPr lang="en-US" dirty="0" smtClean="0"/>
-              <a:t>.</a:t>
-            </a:r>
-            <a:endParaRPr lang="en-US" dirty="0"/>
+              <a:t> of different elements.</a:t>
+            </a:r>
           </a:p>
         </p:txBody>
       </p:sp>
@@ -7316,13 +7156,6 @@
       </p:transition>
     </mc:Fallback>
   </mc:AlternateContent>
-  <p:timing>
-    <p:tnLst>
-      <p:par>
-        <p:cTn id="1" dur="indefinite" restart="never" nodeType="tmRoot"/>
-      </p:par>
-    </p:tnLst>
-  </p:timing>
 </p:sld>
 </file>
 
@@ -7366,11 +7199,11 @@
           <a:lstStyle/>
           <a:p>
             <a:r>
-              <a:rPr lang="en-US" sz="4400" dirty="0" smtClean="0"/>
+              <a:rPr lang="en-US" sz="4400" dirty="0"/>
               <a:t>Node </a:t>
             </a:r>
             <a:r>
-              <a:rPr lang="en-US" sz="4400" dirty="0" err="1" smtClean="0"/>
+              <a:rPr lang="en-US" sz="4400" dirty="0" err="1"/>
               <a:t>Js</a:t>
             </a:r>
             <a:endParaRPr lang="en-US" sz="4400" dirty="0"/>
@@ -7400,28 +7233,28 @@
           <a:lstStyle/>
           <a:p>
             <a:r>
-              <a:rPr lang="en-US" dirty="0" smtClean="0"/>
+              <a:rPr lang="en-US" dirty="0"/>
               <a:t>We will use Node </a:t>
             </a:r>
             <a:r>
-              <a:rPr lang="en-US" dirty="0" err="1" smtClean="0"/>
+              <a:rPr lang="en-US" dirty="0" err="1"/>
               <a:t>Js</a:t>
             </a:r>
             <a:r>
-              <a:rPr lang="en-US" dirty="0" smtClean="0"/>
+              <a:rPr lang="en-US" dirty="0"/>
               <a:t> for Backend Development. It uses JavaScript as its scripting language.</a:t>
             </a:r>
           </a:p>
           <a:p>
             <a:r>
-              <a:rPr lang="en-US" dirty="0" smtClean="0"/>
+              <a:rPr lang="en-US" dirty="0"/>
               <a:t>Overview of Node </a:t>
             </a:r>
             <a:r>
-              <a:rPr lang="en-US" dirty="0" err="1" smtClean="0"/>
+              <a:rPr lang="en-US" dirty="0" err="1"/>
               <a:t>Js</a:t>
             </a:r>
-            <a:endParaRPr lang="en-US" dirty="0" smtClean="0"/>
+            <a:endParaRPr lang="en-US" dirty="0"/>
           </a:p>
           <a:p>
             <a:r>
@@ -7432,13 +7265,8 @@
           <a:p>
             <a:r>
               <a:rPr lang="en-US" dirty="0"/>
-              <a:t>Node.js also provides a rich library of various JavaScript modules which simplifies the development of web applications using Node.js to a great extent</a:t>
-            </a:r>
-            <a:r>
-              <a:rPr lang="en-US" dirty="0" smtClean="0"/>
-              <a:t>.</a:t>
-            </a:r>
-            <a:endParaRPr lang="en-US" dirty="0"/>
+              <a:t>Node.js also provides a rich library of various JavaScript modules which simplifies the development of web applications using Node.js to a great extent.</a:t>
+            </a:r>
           </a:p>
         </p:txBody>
       </p:sp>
@@ -7504,13 +7332,6 @@
       </p:transition>
     </mc:Fallback>
   </mc:AlternateContent>
-  <p:timing>
-    <p:tnLst>
-      <p:par>
-        <p:cTn id="1" dur="indefinite" restart="never" nodeType="tmRoot"/>
-      </p:par>
-    </p:tnLst>
-  </p:timing>
 </p:sld>
 </file>
 
@@ -7549,10 +7370,9 @@
           <a:lstStyle/>
           <a:p>
             <a:r>
-              <a:rPr lang="en-US" sz="4400" dirty="0" smtClean="0"/>
+              <a:rPr lang="en-US" sz="4400" dirty="0"/>
               <a:t>Mongo DB</a:t>
             </a:r>
-            <a:endParaRPr lang="en-US" sz="4400" dirty="0"/>
           </a:p>
         </p:txBody>
       </p:sp>
@@ -7579,20 +7399,11 @@
               <a:rPr lang="en-US" dirty="0"/>
               <a:t> is a document-oriented database which stores data in JSON-like documents with dynamic schema. </a:t>
             </a:r>
-            <a:endParaRPr lang="en-US" dirty="0" smtClean="0"/>
-          </a:p>
-          <a:p>
-            <a:r>
-              <a:rPr lang="en-US" dirty="0" smtClean="0"/>
-              <a:t>It </a:t>
-            </a:r>
+          </a:p>
+          <a:p>
             <a:r>
               <a:rPr lang="en-US" dirty="0"/>
-              <a:t>means you can store your records without worrying about the data structure such as the number of fields or types of fields to store values</a:t>
-            </a:r>
-            <a:r>
-              <a:rPr lang="en-US" dirty="0" smtClean="0"/>
-              <a:t>.</a:t>
+              <a:t>It means you can store your records without worrying about the data structure such as the number of fields or types of fields to store values.</a:t>
             </a:r>
           </a:p>
           <a:p>
@@ -7661,25 +7472,18 @@
   <p:clrMapOvr>
     <a:masterClrMapping/>
   </p:clrMapOvr>
-  <mc:AlternateContent xmlns:mc="http://schemas.openxmlformats.org/markup-compatibility/2006">
-    <mc:Choice xmlns:p15="http://schemas.microsoft.com/office/powerpoint/2012/main" Requires="p15">
+  <mc:AlternateContent xmlns:mc="http://schemas.openxmlformats.org/markup-compatibility/2006" xmlns:p15="http://schemas.microsoft.com/office/powerpoint/2012/main">
+    <mc:Choice Requires="p15">
       <p:transition xmlns:p14="http://schemas.microsoft.com/office/powerpoint/2010/main" spd="slow" p14:dur="1250">
         <p15:prstTrans prst="peelOff"/>
       </p:transition>
     </mc:Choice>
-    <mc:Fallback>
+    <mc:Fallback xmlns="">
       <p:transition spd="slow">
         <p:fade/>
       </p:transition>
     </mc:Fallback>
   </mc:AlternateContent>
-  <p:timing>
-    <p:tnLst>
-      <p:par>
-        <p:cTn id="1" dur="indefinite" restart="never" nodeType="tmRoot"/>
-      </p:par>
-    </p:tnLst>
-  </p:timing>
 </p:sld>
 </file>
 

</xml_diff>